<commit_message>
update report for the final report submission
</commit_message>
<xml_diff>
--- a/report/gen-disc-parallel-figure.pptx
+++ b/report/gen-disc-parallel-figure.pptx
@@ -243,7 +243,7 @@
           <a:p>
             <a:fld id="{97B41076-CB1D-A34A-BCF0-74CB5DEB95F1}" type="datetimeFigureOut">
               <a:rPr lang="en-US" smtClean="0"/>
-              <a:t>3/8/21</a:t>
+              <a:t>3/17/21</a:t>
             </a:fld>
             <a:endParaRPr lang="en-US"/>
           </a:p>
@@ -413,7 +413,7 @@
           <a:p>
             <a:fld id="{97B41076-CB1D-A34A-BCF0-74CB5DEB95F1}" type="datetimeFigureOut">
               <a:rPr lang="en-US" smtClean="0"/>
-              <a:t>3/8/21</a:t>
+              <a:t>3/17/21</a:t>
             </a:fld>
             <a:endParaRPr lang="en-US"/>
           </a:p>
@@ -593,7 +593,7 @@
           <a:p>
             <a:fld id="{97B41076-CB1D-A34A-BCF0-74CB5DEB95F1}" type="datetimeFigureOut">
               <a:rPr lang="en-US" smtClean="0"/>
-              <a:t>3/8/21</a:t>
+              <a:t>3/17/21</a:t>
             </a:fld>
             <a:endParaRPr lang="en-US"/>
           </a:p>
@@ -763,7 +763,7 @@
           <a:p>
             <a:fld id="{97B41076-CB1D-A34A-BCF0-74CB5DEB95F1}" type="datetimeFigureOut">
               <a:rPr lang="en-US" smtClean="0"/>
-              <a:t>3/8/21</a:t>
+              <a:t>3/17/21</a:t>
             </a:fld>
             <a:endParaRPr lang="en-US"/>
           </a:p>
@@ -1007,7 +1007,7 @@
           <a:p>
             <a:fld id="{97B41076-CB1D-A34A-BCF0-74CB5DEB95F1}" type="datetimeFigureOut">
               <a:rPr lang="en-US" smtClean="0"/>
-              <a:t>3/8/21</a:t>
+              <a:t>3/17/21</a:t>
             </a:fld>
             <a:endParaRPr lang="en-US"/>
           </a:p>
@@ -1239,7 +1239,7 @@
           <a:p>
             <a:fld id="{97B41076-CB1D-A34A-BCF0-74CB5DEB95F1}" type="datetimeFigureOut">
               <a:rPr lang="en-US" smtClean="0"/>
-              <a:t>3/8/21</a:t>
+              <a:t>3/17/21</a:t>
             </a:fld>
             <a:endParaRPr lang="en-US"/>
           </a:p>
@@ -1606,7 +1606,7 @@
           <a:p>
             <a:fld id="{97B41076-CB1D-A34A-BCF0-74CB5DEB95F1}" type="datetimeFigureOut">
               <a:rPr lang="en-US" smtClean="0"/>
-              <a:t>3/8/21</a:t>
+              <a:t>3/17/21</a:t>
             </a:fld>
             <a:endParaRPr lang="en-US"/>
           </a:p>
@@ -1724,7 +1724,7 @@
           <a:p>
             <a:fld id="{97B41076-CB1D-A34A-BCF0-74CB5DEB95F1}" type="datetimeFigureOut">
               <a:rPr lang="en-US" smtClean="0"/>
-              <a:t>3/8/21</a:t>
+              <a:t>3/17/21</a:t>
             </a:fld>
             <a:endParaRPr lang="en-US"/>
           </a:p>
@@ -1819,7 +1819,7 @@
           <a:p>
             <a:fld id="{97B41076-CB1D-A34A-BCF0-74CB5DEB95F1}" type="datetimeFigureOut">
               <a:rPr lang="en-US" smtClean="0"/>
-              <a:t>3/8/21</a:t>
+              <a:t>3/17/21</a:t>
             </a:fld>
             <a:endParaRPr lang="en-US"/>
           </a:p>
@@ -2096,7 +2096,7 @@
           <a:p>
             <a:fld id="{97B41076-CB1D-A34A-BCF0-74CB5DEB95F1}" type="datetimeFigureOut">
               <a:rPr lang="en-US" smtClean="0"/>
-              <a:t>3/8/21</a:t>
+              <a:t>3/17/21</a:t>
             </a:fld>
             <a:endParaRPr lang="en-US"/>
           </a:p>
@@ -2353,7 +2353,7 @@
           <a:p>
             <a:fld id="{97B41076-CB1D-A34A-BCF0-74CB5DEB95F1}" type="datetimeFigureOut">
               <a:rPr lang="en-US" smtClean="0"/>
-              <a:t>3/8/21</a:t>
+              <a:t>3/17/21</a:t>
             </a:fld>
             <a:endParaRPr lang="en-US"/>
           </a:p>
@@ -2566,7 +2566,7 @@
           <a:p>
             <a:fld id="{97B41076-CB1D-A34A-BCF0-74CB5DEB95F1}" type="datetimeFigureOut">
               <a:rPr lang="en-US" smtClean="0"/>
-              <a:t>3/8/21</a:t>
+              <a:t>3/17/21</a:t>
             </a:fld>
             <a:endParaRPr lang="en-US"/>
           </a:p>
@@ -2973,10 +2973,10 @@
       </p:grpSpPr>
       <p:sp>
         <p:nvSpPr>
-          <p:cNvPr id="4" name="Rectangle 3">
+          <p:cNvPr id="6" name="Rectangle 5">
             <a:extLst>
               <a:ext uri="{FF2B5EF4-FFF2-40B4-BE49-F238E27FC236}">
-                <a16:creationId xmlns:a16="http://schemas.microsoft.com/office/drawing/2014/main" id="{0306808A-C07C-144A-A36E-38CE60D73F1D}"/>
+                <a16:creationId xmlns:a16="http://schemas.microsoft.com/office/drawing/2014/main" id="{DDEE0346-FB86-F145-A446-C511EDAD691B}"/>
               </a:ext>
             </a:extLst>
           </p:cNvPr>
@@ -2985,8 +2985,8 @@
         </p:nvSpPr>
         <p:spPr>
           <a:xfrm>
-            <a:off x="738266" y="3113316"/>
-            <a:ext cx="2438400" cy="827315"/>
+            <a:off x="879422" y="3113316"/>
+            <a:ext cx="5312765" cy="565616"/>
           </a:xfrm>
           <a:prstGeom prst="rect">
             <a:avLst/>
@@ -3014,53 +3014,6 @@
             <a:r>
               <a:rPr lang="en-US" dirty="0"/>
               <a:t>Encoder</a:t>
-            </a:r>
-          </a:p>
-        </p:txBody>
-      </p:sp>
-      <p:sp>
-        <p:nvSpPr>
-          <p:cNvPr id="6" name="Rectangle 5">
-            <a:extLst>
-              <a:ext uri="{FF2B5EF4-FFF2-40B4-BE49-F238E27FC236}">
-                <a16:creationId xmlns:a16="http://schemas.microsoft.com/office/drawing/2014/main" id="{DDEE0346-FB86-F145-A446-C511EDAD691B}"/>
-              </a:ext>
-            </a:extLst>
-          </p:cNvPr>
-          <p:cNvSpPr/>
-          <p:nvPr/>
-        </p:nvSpPr>
-        <p:spPr>
-          <a:xfrm>
-            <a:off x="3753787" y="3113315"/>
-            <a:ext cx="2438400" cy="827315"/>
-          </a:xfrm>
-          <a:prstGeom prst="rect">
-            <a:avLst/>
-          </a:prstGeom>
-        </p:spPr>
-        <p:style>
-          <a:lnRef idx="2">
-            <a:schemeClr val="dk1"/>
-          </a:lnRef>
-          <a:fillRef idx="1">
-            <a:schemeClr val="lt1"/>
-          </a:fillRef>
-          <a:effectRef idx="0">
-            <a:schemeClr val="dk1"/>
-          </a:effectRef>
-          <a:fontRef idx="minor">
-            <a:schemeClr val="dk1"/>
-          </a:fontRef>
-        </p:style>
-        <p:txBody>
-          <a:bodyPr rtlCol="0" anchor="ctr"/>
-          <a:lstStyle/>
-          <a:p>
-            <a:pPr algn="ctr"/>
-            <a:r>
-              <a:rPr lang="en-US" dirty="0"/>
-              <a:t>Decoder</a:t>
             </a:r>
           </a:p>
         </p:txBody>
@@ -3081,8 +3034,8 @@
             </p:nvSpPr>
             <p:spPr>
               <a:xfrm>
-                <a:off x="926268" y="4377127"/>
-                <a:ext cx="2062397" cy="389337"/>
+                <a:off x="1231066" y="4052862"/>
+                <a:ext cx="2062397" cy="369332"/>
               </a:xfrm>
               <a:prstGeom prst="rect">
                 <a:avLst/>
@@ -3098,10 +3051,16 @@
                 <a14:m>
                   <m:oMath xmlns:m="http://schemas.openxmlformats.org/officeDocument/2006/math">
                     <m:r>
-                      <a:rPr lang="en-US" i="1">
+                      <a:rPr lang="en-US" i="1" smtClean="0">
                         <a:latin typeface="Cambria Math" panose="02040503050406030204" pitchFamily="18" charset="0"/>
                       </a:rPr>
                       <m:t>… </m:t>
+                    </m:r>
+                    <m:r>
+                      <a:rPr lang="en-US" b="0" i="1" smtClean="0">
+                        <a:latin typeface="Cambria Math" panose="02040503050406030204" pitchFamily="18" charset="0"/>
+                      </a:rPr>
+                      <m:t> </m:t>
                     </m:r>
                     <m:sSub>
                       <m:sSubPr>
@@ -3120,38 +3079,37 @@
                         </m:r>
                       </m:e>
                       <m:sub>
-                        <m:d>
-                          <m:dPr>
-                            <m:begChr m:val="{"/>
-                            <m:endChr m:val="}"/>
-                            <m:ctrlPr>
-                              <a:rPr lang="en-US" i="1">
-                                <a:latin typeface="Cambria Math" panose="02040503050406030204" pitchFamily="18" charset="0"/>
-                              </a:rPr>
-                            </m:ctrlPr>
-                          </m:dPr>
-                          <m:e>
-                            <m:r>
-                              <a:rPr lang="en-US" i="1">
-                                <a:latin typeface="Cambria Math" panose="02040503050406030204" pitchFamily="18" charset="0"/>
-                              </a:rPr>
-                              <m:t>𝑖</m:t>
-                            </m:r>
-                            <m:r>
-                              <a:rPr lang="en-US" i="1">
-                                <a:latin typeface="Cambria Math" panose="02040503050406030204" pitchFamily="18" charset="0"/>
-                              </a:rPr>
-                              <m:t>−2</m:t>
-                            </m:r>
-                          </m:e>
-                        </m:d>
+                        <m:r>
+                          <a:rPr lang="en-US" b="0" i="1" smtClean="0">
+                            <a:latin typeface="Cambria Math" panose="02040503050406030204" pitchFamily="18" charset="0"/>
+                          </a:rPr>
+                          <m:t>𝑖</m:t>
+                        </m:r>
+                        <m:r>
+                          <a:rPr lang="en-US" b="0" i="1" smtClean="0">
+                            <a:latin typeface="Cambria Math" panose="02040503050406030204" pitchFamily="18" charset="0"/>
+                          </a:rPr>
+                          <m:t>−2</m:t>
+                        </m:r>
                       </m:sub>
                     </m:sSub>
                     <m:r>
                       <a:rPr lang="en-US" i="1">
                         <a:latin typeface="Cambria Math" panose="02040503050406030204" pitchFamily="18" charset="0"/>
                       </a:rPr>
-                      <m:t>  </m:t>
+                      <m:t> </m:t>
+                    </m:r>
+                    <m:r>
+                      <a:rPr lang="en-US" b="0" i="1" smtClean="0">
+                        <a:latin typeface="Cambria Math" panose="02040503050406030204" pitchFamily="18" charset="0"/>
+                      </a:rPr>
+                      <m:t>   </m:t>
+                    </m:r>
+                    <m:r>
+                      <a:rPr lang="en-US" i="1">
+                        <a:latin typeface="Cambria Math" panose="02040503050406030204" pitchFamily="18" charset="0"/>
+                      </a:rPr>
+                      <m:t> </m:t>
                     </m:r>
                     <m:sSub>
                       <m:sSubPr>
@@ -3170,38 +3128,37 @@
                         </m:r>
                       </m:e>
                       <m:sub>
-                        <m:d>
-                          <m:dPr>
-                            <m:begChr m:val="{"/>
-                            <m:endChr m:val="}"/>
-                            <m:ctrlPr>
-                              <a:rPr lang="en-US" i="1">
-                                <a:latin typeface="Cambria Math" panose="02040503050406030204" pitchFamily="18" charset="0"/>
-                              </a:rPr>
-                            </m:ctrlPr>
-                          </m:dPr>
-                          <m:e>
-                            <m:r>
-                              <a:rPr lang="en-US" i="1">
-                                <a:latin typeface="Cambria Math" panose="02040503050406030204" pitchFamily="18" charset="0"/>
-                              </a:rPr>
-                              <m:t>𝑖</m:t>
-                            </m:r>
-                            <m:r>
-                              <a:rPr lang="en-US" i="1">
-                                <a:latin typeface="Cambria Math" panose="02040503050406030204" pitchFamily="18" charset="0"/>
-                              </a:rPr>
-                              <m:t>−1</m:t>
-                            </m:r>
-                          </m:e>
-                        </m:d>
+                        <m:r>
+                          <a:rPr lang="en-US" b="0" i="1" smtClean="0">
+                            <a:latin typeface="Cambria Math" panose="02040503050406030204" pitchFamily="18" charset="0"/>
+                          </a:rPr>
+                          <m:t>𝑖</m:t>
+                        </m:r>
+                        <m:r>
+                          <a:rPr lang="en-US" b="0" i="1" smtClean="0">
+                            <a:latin typeface="Cambria Math" panose="02040503050406030204" pitchFamily="18" charset="0"/>
+                          </a:rPr>
+                          <m:t>−1</m:t>
+                        </m:r>
                       </m:sub>
                     </m:sSub>
                     <m:r>
-                      <a:rPr lang="en-US" i="1">
+                      <a:rPr lang="en-US" i="1" smtClean="0">
                         <a:latin typeface="Cambria Math" panose="02040503050406030204" pitchFamily="18" charset="0"/>
                       </a:rPr>
-                      <m:t>  </m:t>
+                      <m:t> </m:t>
+                    </m:r>
+                    <m:r>
+                      <a:rPr lang="en-US" b="0" i="1" smtClean="0">
+                        <a:latin typeface="Cambria Math" panose="02040503050406030204" pitchFamily="18" charset="0"/>
+                      </a:rPr>
+                      <m:t>   </m:t>
+                    </m:r>
+                    <m:r>
+                      <a:rPr lang="en-US" i="1" smtClean="0">
+                        <a:latin typeface="Cambria Math" panose="02040503050406030204" pitchFamily="18" charset="0"/>
+                      </a:rPr>
+                      <m:t> </m:t>
                     </m:r>
                     <m:sSub>
                       <m:sSubPr>
@@ -3220,25 +3177,12 @@
                         </m:r>
                       </m:e>
                       <m:sub>
-                        <m:d>
-                          <m:dPr>
-                            <m:begChr m:val="{"/>
-                            <m:endChr m:val="}"/>
-                            <m:ctrlPr>
-                              <a:rPr lang="en-US" i="1">
-                                <a:latin typeface="Cambria Math" panose="02040503050406030204" pitchFamily="18" charset="0"/>
-                              </a:rPr>
-                            </m:ctrlPr>
-                          </m:dPr>
-                          <m:e>
-                            <m:r>
-                              <a:rPr lang="en-US" i="1">
-                                <a:latin typeface="Cambria Math" panose="02040503050406030204" pitchFamily="18" charset="0"/>
-                              </a:rPr>
-                              <m:t>𝑖</m:t>
-                            </m:r>
-                          </m:e>
-                        </m:d>
+                        <m:r>
+                          <a:rPr lang="en-US" b="0" i="1" smtClean="0">
+                            <a:latin typeface="Cambria Math" panose="02040503050406030204" pitchFamily="18" charset="0"/>
+                          </a:rPr>
+                          <m:t>𝑖</m:t>
+                        </m:r>
                       </m:sub>
                     </m:sSub>
                   </m:oMath>
@@ -3268,8 +3212,8 @@
             </p:nvSpPr>
             <p:spPr>
               <a:xfrm>
-                <a:off x="926268" y="4377127"/>
-                <a:ext cx="2062397" cy="389337"/>
+                <a:off x="1231066" y="4052862"/>
+                <a:ext cx="2062397" cy="369332"/>
               </a:xfrm>
               <a:prstGeom prst="rect">
                 <a:avLst/>
@@ -3277,7 +3221,7 @@
               <a:blipFill>
                 <a:blip r:embed="rId2"/>
                 <a:stretch>
-                  <a:fillRect b="-9375"/>
+                  <a:fillRect b="-17241"/>
                 </a:stretch>
               </a:blipFill>
             </p:spPr>
@@ -3310,8 +3254,8 @@
         </p:nvSpPr>
         <p:spPr>
           <a:xfrm>
-            <a:off x="2553324" y="3968419"/>
-            <a:ext cx="286687" cy="436497"/>
+            <a:off x="2858122" y="3665859"/>
+            <a:ext cx="286687" cy="480147"/>
           </a:xfrm>
           <a:prstGeom prst="triangle">
             <a:avLst/>
@@ -3357,8 +3301,8 @@
         </p:nvSpPr>
         <p:spPr>
           <a:xfrm>
-            <a:off x="1971830" y="4008670"/>
-            <a:ext cx="286687" cy="436497"/>
+            <a:off x="2276628" y="3682047"/>
+            <a:ext cx="286687" cy="480147"/>
           </a:xfrm>
           <a:prstGeom prst="triangle">
             <a:avLst/>
@@ -3404,8 +3348,8 @@
         </p:nvSpPr>
         <p:spPr>
           <a:xfrm>
-            <a:off x="1390336" y="4008670"/>
-            <a:ext cx="286687" cy="436497"/>
+            <a:off x="1695134" y="3682047"/>
+            <a:ext cx="286687" cy="480147"/>
           </a:xfrm>
           <a:prstGeom prst="triangle">
             <a:avLst/>
@@ -3451,7 +3395,7 @@
         </p:nvSpPr>
         <p:spPr>
           <a:xfrm>
-            <a:off x="3216639" y="4404916"/>
+            <a:off x="3521437" y="4404916"/>
             <a:ext cx="286687" cy="389337"/>
           </a:xfrm>
           <a:prstGeom prst="ellipse">
@@ -3486,51 +3430,6 @@
           </a:p>
         </p:txBody>
       </p:sp>
-      <p:cxnSp>
-        <p:nvCxnSpPr>
-          <p:cNvPr id="24" name="Elbow Connector 23">
-            <a:extLst>
-              <a:ext uri="{FF2B5EF4-FFF2-40B4-BE49-F238E27FC236}">
-                <a16:creationId xmlns:a16="http://schemas.microsoft.com/office/drawing/2014/main" id="{F5745B3B-3142-B442-A84E-2D3E6931D4BF}"/>
-              </a:ext>
-            </a:extLst>
-          </p:cNvPr>
-          <p:cNvCxnSpPr>
-            <a:stCxn id="4" idx="0"/>
-            <a:endCxn id="6" idx="1"/>
-          </p:cNvCxnSpPr>
-          <p:nvPr/>
-        </p:nvCxnSpPr>
-        <p:spPr>
-          <a:xfrm rot="16200000" flipH="1">
-            <a:off x="2648798" y="2421984"/>
-            <a:ext cx="413657" cy="1796321"/>
-          </a:xfrm>
-          <a:prstGeom prst="bentConnector4">
-            <a:avLst>
-              <a:gd name="adj1" fmla="val -55263"/>
-              <a:gd name="adj2" fmla="val 83936"/>
-            </a:avLst>
-          </a:prstGeom>
-          <a:ln>
-            <a:tailEnd type="triangle"/>
-          </a:ln>
-        </p:spPr>
-        <p:style>
-          <a:lnRef idx="1">
-            <a:schemeClr val="dk1"/>
-          </a:lnRef>
-          <a:fillRef idx="0">
-            <a:schemeClr val="dk1"/>
-          </a:fillRef>
-          <a:effectRef idx="0">
-            <a:schemeClr val="dk1"/>
-          </a:effectRef>
-          <a:fontRef idx="minor">
-            <a:schemeClr val="tx1"/>
-          </a:fontRef>
-        </p:style>
-      </p:cxnSp>
       <mc:AlternateContent xmlns:mc="http://schemas.openxmlformats.org/markup-compatibility/2006">
         <mc:Choice xmlns:a14="http://schemas.microsoft.com/office/drawing/2010/main" Requires="a14">
           <p:sp>
@@ -3547,8 +3446,8 @@
             </p:nvSpPr>
             <p:spPr>
               <a:xfrm>
-                <a:off x="3606738" y="4464214"/>
-                <a:ext cx="2587231" cy="461665"/>
+                <a:off x="1137556" y="4618668"/>
+                <a:ext cx="2564829" cy="461665"/>
               </a:xfrm>
               <a:prstGeom prst="rect">
                 <a:avLst/>
@@ -3561,12 +3460,16 @@
               </a:bodyPr>
               <a:lstStyle/>
               <a:p>
+                <a:r>
+                  <a:rPr lang="en-US" sz="1200" dirty="0"/>
+                  <a:t>… </a:t>
+                </a:r>
                 <a14:m>
                   <m:oMath xmlns:m="http://schemas.openxmlformats.org/officeDocument/2006/math">
                     <m:sSub>
                       <m:sSubPr>
                         <m:ctrlPr>
-                          <a:rPr lang="en-US" sz="1200" i="1">
+                          <a:rPr lang="en-US" sz="1200" i="1" smtClean="0">
                             <a:latin typeface="Cambria Math" panose="02040503050406030204" pitchFamily="18" charset="0"/>
                           </a:rPr>
                         </m:ctrlPr>
@@ -3581,10 +3484,16 @@
                       </m:e>
                       <m:sub>
                         <m:r>
-                          <a:rPr lang="en-US" sz="1200" i="1">
+                          <a:rPr lang="en-US" sz="1200" b="0" i="1" smtClean="0">
                             <a:latin typeface="Cambria Math" panose="02040503050406030204" pitchFamily="18" charset="0"/>
                           </a:rPr>
-                          <m:t>1</m:t>
+                          <m:t>𝑖</m:t>
+                        </m:r>
+                        <m:r>
+                          <a:rPr lang="en-US" sz="1200" b="0" i="1" smtClean="0">
+                            <a:latin typeface="Cambria Math" panose="02040503050406030204" pitchFamily="18" charset="0"/>
+                          </a:rPr>
+                          <m:t>−2</m:t>
                         </m:r>
                       </m:sub>
                     </m:sSub>
@@ -3600,17 +3509,11 @@
                       </a:rPr>
                       <m:t>𝑁</m:t>
                     </m:r>
-                    <m:r>
-                      <a:rPr lang="en-US" sz="1200" i="1">
-                        <a:latin typeface="Cambria Math" panose="02040503050406030204" pitchFamily="18" charset="0"/>
-                      </a:rPr>
-                      <m:t>(0,1)</m:t>
-                    </m:r>
                   </m:oMath>
                 </a14:m>
                 <a:r>
                   <a:rPr lang="en-US" sz="1200" dirty="0"/>
-                  <a:t>  </a:t>
+                  <a:t>    </a:t>
                 </a:r>
                 <a14:m>
                   <m:oMath xmlns:m="http://schemas.openxmlformats.org/officeDocument/2006/math">
@@ -3632,36 +3535,36 @@
                       </m:e>
                       <m:sub>
                         <m:r>
-                          <a:rPr lang="en-US" sz="1200" i="1">
+                          <a:rPr lang="en-US" sz="1200" b="0" i="1" smtClean="0">
                             <a:latin typeface="Cambria Math" panose="02040503050406030204" pitchFamily="18" charset="0"/>
                           </a:rPr>
-                          <m:t>2</m:t>
+                          <m:t>𝑖</m:t>
+                        </m:r>
+                        <m:r>
+                          <a:rPr lang="en-US" sz="1200" b="0" i="1" smtClean="0">
+                            <a:latin typeface="Cambria Math" panose="02040503050406030204" pitchFamily="18" charset="0"/>
+                          </a:rPr>
+                          <m:t>−1</m:t>
                         </m:r>
                       </m:sub>
                     </m:sSub>
                     <m:r>
-                      <a:rPr lang="en-US" sz="1200" i="1">
+                      <a:rPr lang="en-US" sz="1200" i="1" smtClean="0">
                         <a:latin typeface="Cambria Math" panose="02040503050406030204" pitchFamily="18" charset="0"/>
                       </a:rPr>
                       <m:t>~</m:t>
                     </m:r>
                     <m:r>
-                      <a:rPr lang="en-US" sz="1200" i="1">
+                      <a:rPr lang="en-US" sz="1200" i="1" smtClean="0">
                         <a:latin typeface="Cambria Math" panose="02040503050406030204" pitchFamily="18" charset="0"/>
                       </a:rPr>
                       <m:t>𝑁</m:t>
-                    </m:r>
-                    <m:r>
-                      <a:rPr lang="en-US" sz="1200" i="1">
-                        <a:latin typeface="Cambria Math" panose="02040503050406030204" pitchFamily="18" charset="0"/>
-                      </a:rPr>
-                      <m:t>(0,1)</m:t>
                     </m:r>
                   </m:oMath>
                 </a14:m>
                 <a:r>
                   <a:rPr lang="en-US" sz="1200" dirty="0"/>
-                  <a:t>  </a:t>
+                  <a:t>      </a:t>
                 </a:r>
                 <a14:m>
                   <m:oMath xmlns:m="http://schemas.openxmlformats.org/officeDocument/2006/math">
@@ -3683,10 +3586,10 @@
                       </m:e>
                       <m:sub>
                         <m:r>
-                          <a:rPr lang="en-US" sz="1200" i="1">
+                          <a:rPr lang="en-US" sz="1200" b="0" i="1" smtClean="0">
                             <a:latin typeface="Cambria Math" panose="02040503050406030204" pitchFamily="18" charset="0"/>
                           </a:rPr>
-                          <m:t>3</m:t>
+                          <m:t>𝑖</m:t>
                         </m:r>
                       </m:sub>
                     </m:sSub>
@@ -3702,35 +3605,9 @@
                       </a:rPr>
                       <m:t>𝑁</m:t>
                     </m:r>
-                    <m:d>
-                      <m:dPr>
-                        <m:ctrlPr>
-                          <a:rPr lang="en-US" sz="1200" i="1">
-                            <a:latin typeface="Cambria Math" panose="02040503050406030204" pitchFamily="18" charset="0"/>
-                          </a:rPr>
-                        </m:ctrlPr>
-                      </m:dPr>
-                      <m:e>
-                        <m:r>
-                          <a:rPr lang="en-US" sz="1200" i="1">
-                            <a:latin typeface="Cambria Math" panose="02040503050406030204" pitchFamily="18" charset="0"/>
-                          </a:rPr>
-                          <m:t>0,1</m:t>
-                        </m:r>
-                      </m:e>
-                    </m:d>
-                    <m:r>
-                      <a:rPr lang="en-US" sz="1200" i="1">
-                        <a:latin typeface="Cambria Math" panose="02040503050406030204" pitchFamily="18" charset="0"/>
-                      </a:rPr>
-                      <m:t>…</m:t>
-                    </m:r>
                   </m:oMath>
                 </a14:m>
-                <a:r>
-                  <a:rPr lang="en-US" sz="1200" dirty="0"/>
-                  <a:t> </a:t>
-                </a:r>
+                <a:endParaRPr lang="en-US" sz="1200" dirty="0"/>
               </a:p>
               <a:p>
                 <a:endParaRPr lang="en-US" sz="1200" dirty="0"/>
@@ -3755,8 +3632,8 @@
             </p:nvSpPr>
             <p:spPr>
               <a:xfrm>
-                <a:off x="3606738" y="4464214"/>
-                <a:ext cx="2587231" cy="461665"/>
+                <a:off x="1137556" y="4618668"/>
+                <a:ext cx="2564829" cy="461665"/>
               </a:xfrm>
               <a:prstGeom prst="rect">
                 <a:avLst/>
@@ -3797,11 +3674,13 @@
         </p:nvSpPr>
         <p:spPr>
           <a:xfrm>
-            <a:off x="5099779" y="3940630"/>
-            <a:ext cx="286687" cy="436497"/>
+            <a:off x="2701487" y="4291332"/>
+            <a:ext cx="214393" cy="326425"/>
           </a:xfrm>
           <a:prstGeom prst="triangle">
-            <a:avLst/>
+            <a:avLst>
+              <a:gd name="adj" fmla="val 47202"/>
+            </a:avLst>
           </a:prstGeom>
         </p:spPr>
         <p:style>
@@ -3825,7 +3704,7 @@
             <a:pPr algn="ctr"/>
             <a:r>
               <a:rPr lang="en-US" dirty="0"/>
-              <a:t>+</a:t>
+              <a:t>;</a:t>
             </a:r>
           </a:p>
         </p:txBody>
@@ -3844,8 +3723,8 @@
         </p:nvSpPr>
         <p:spPr>
           <a:xfrm>
-            <a:off x="4518285" y="3980881"/>
-            <a:ext cx="286687" cy="436497"/>
+            <a:off x="2055826" y="4332205"/>
+            <a:ext cx="208716" cy="317782"/>
           </a:xfrm>
           <a:prstGeom prst="triangle">
             <a:avLst/>
@@ -3872,7 +3751,7 @@
             <a:pPr algn="ctr"/>
             <a:r>
               <a:rPr lang="en-US" dirty="0"/>
-              <a:t>+</a:t>
+              <a:t>;</a:t>
             </a:r>
           </a:p>
         </p:txBody>
@@ -3891,8 +3770,8 @@
         </p:nvSpPr>
         <p:spPr>
           <a:xfrm>
-            <a:off x="3936791" y="3980881"/>
-            <a:ext cx="286687" cy="436497"/>
+            <a:off x="1426206" y="4316163"/>
+            <a:ext cx="208716" cy="317782"/>
           </a:xfrm>
           <a:prstGeom prst="triangle">
             <a:avLst/>
@@ -3919,30 +3798,31 @@
             <a:pPr algn="ctr"/>
             <a:r>
               <a:rPr lang="en-US" dirty="0"/>
-              <a:t>+</a:t>
+              <a:t>;</a:t>
             </a:r>
           </a:p>
         </p:txBody>
       </p:sp>
       <p:cxnSp>
         <p:nvCxnSpPr>
-          <p:cNvPr id="60" name="Elbow Connector 59">
+          <p:cNvPr id="62" name="Elbow Connector 61">
             <a:extLst>
               <a:ext uri="{FF2B5EF4-FFF2-40B4-BE49-F238E27FC236}">
-                <a16:creationId xmlns:a16="http://schemas.microsoft.com/office/drawing/2014/main" id="{058CD55C-5AE4-0049-A6E8-442571D82EA2}"/>
+                <a16:creationId xmlns:a16="http://schemas.microsoft.com/office/drawing/2014/main" id="{E56CB6D1-2D50-0140-A1F0-3DE1AA89E13C}"/>
               </a:ext>
             </a:extLst>
           </p:cNvPr>
           <p:cNvCxnSpPr>
+            <a:cxnSpLocks/>
             <a:stCxn id="11" idx="0"/>
-            <a:endCxn id="28" idx="1"/>
+            <a:endCxn id="8" idx="5"/>
           </p:cNvCxnSpPr>
           <p:nvPr/>
         </p:nvCxnSpPr>
         <p:spPr>
-          <a:xfrm rot="5400000" flipH="1" flipV="1">
-            <a:off x="3581329" y="3977782"/>
-            <a:ext cx="205786" cy="648480"/>
+          <a:xfrm rot="16200000" flipV="1">
+            <a:off x="3119468" y="3859603"/>
+            <a:ext cx="498983" cy="591644"/>
           </a:xfrm>
           <a:prstGeom prst="bentConnector2">
             <a:avLst/>
@@ -3966,48 +3846,6 @@
           </a:fontRef>
         </p:style>
       </p:cxnSp>
-      <p:cxnSp>
-        <p:nvCxnSpPr>
-          <p:cNvPr id="62" name="Elbow Connector 61">
-            <a:extLst>
-              <a:ext uri="{FF2B5EF4-FFF2-40B4-BE49-F238E27FC236}">
-                <a16:creationId xmlns:a16="http://schemas.microsoft.com/office/drawing/2014/main" id="{E56CB6D1-2D50-0140-A1F0-3DE1AA89E13C}"/>
-              </a:ext>
-            </a:extLst>
-          </p:cNvPr>
-          <p:cNvCxnSpPr>
-            <a:stCxn id="11" idx="0"/>
-            <a:endCxn id="8" idx="5"/>
-          </p:cNvCxnSpPr>
-          <p:nvPr/>
-        </p:nvCxnSpPr>
-        <p:spPr>
-          <a:xfrm rot="16200000" flipV="1">
-            <a:off x="2955036" y="3999969"/>
-            <a:ext cx="218248" cy="591644"/>
-          </a:xfrm>
-          <a:prstGeom prst="bentConnector2">
-            <a:avLst/>
-          </a:prstGeom>
-          <a:ln>
-            <a:tailEnd type="triangle"/>
-          </a:ln>
-        </p:spPr>
-        <p:style>
-          <a:lnRef idx="1">
-            <a:schemeClr val="dk1"/>
-          </a:lnRef>
-          <a:fillRef idx="0">
-            <a:schemeClr val="dk1"/>
-          </a:fillRef>
-          <a:effectRef idx="0">
-            <a:schemeClr val="dk1"/>
-          </a:effectRef>
-          <a:fontRef idx="minor">
-            <a:schemeClr val="tx1"/>
-          </a:fontRef>
-        </p:style>
-      </p:cxnSp>
       <p:sp>
         <p:nvSpPr>
           <p:cNvPr id="68" name="Triangle 67">
@@ -4140,8 +3978,8 @@
           </a:p>
         </p:txBody>
       </p:sp>
-      <mc:AlternateContent xmlns:mc="http://schemas.openxmlformats.org/markup-compatibility/2006">
-        <mc:Choice xmlns:a14="http://schemas.microsoft.com/office/drawing/2010/main" Requires="a14">
+      <mc:AlternateContent xmlns:mc="http://schemas.openxmlformats.org/markup-compatibility/2006" xmlns:a14="http://schemas.microsoft.com/office/drawing/2010/main">
+        <mc:Choice Requires="a14">
           <p:sp>
             <p:nvSpPr>
               <p:cNvPr id="71" name="TextBox 70">
@@ -4326,7 +4164,7 @@
             </p:txBody>
           </p:sp>
         </mc:Choice>
-        <mc:Fallback>
+        <mc:Fallback xmlns="">
           <p:sp>
             <p:nvSpPr>
               <p:cNvPr id="71" name="TextBox 70">
@@ -4387,8 +4225,8 @@
             </p:nvSpPr>
             <p:spPr>
               <a:xfrm>
-                <a:off x="986228" y="1844562"/>
-                <a:ext cx="2062397" cy="389337"/>
+                <a:off x="1120576" y="1837734"/>
+                <a:ext cx="2062397" cy="369332"/>
               </a:xfrm>
               <a:prstGeom prst="rect">
                 <a:avLst/>
@@ -4404,10 +4242,10 @@
                 <a14:m>
                   <m:oMath xmlns:m="http://schemas.openxmlformats.org/officeDocument/2006/math">
                     <m:r>
-                      <a:rPr lang="en-US" i="1">
+                      <a:rPr lang="en-US" i="1" smtClean="0">
                         <a:latin typeface="Cambria Math" panose="02040503050406030204" pitchFamily="18" charset="0"/>
                       </a:rPr>
-                      <m:t>….</m:t>
+                      <m:t>…</m:t>
                     </m:r>
                     <m:sSub>
                       <m:sSubPr>
@@ -4426,38 +4264,37 @@
                         </m:r>
                       </m:e>
                       <m:sub>
-                        <m:d>
-                          <m:dPr>
-                            <m:begChr m:val="{"/>
-                            <m:endChr m:val="}"/>
-                            <m:ctrlPr>
-                              <a:rPr lang="en-US" i="1">
-                                <a:latin typeface="Cambria Math" panose="02040503050406030204" pitchFamily="18" charset="0"/>
-                              </a:rPr>
-                            </m:ctrlPr>
-                          </m:dPr>
-                          <m:e>
-                            <m:r>
-                              <a:rPr lang="en-US" i="1">
-                                <a:latin typeface="Cambria Math" panose="02040503050406030204" pitchFamily="18" charset="0"/>
-                              </a:rPr>
-                              <m:t>𝑖</m:t>
-                            </m:r>
-                            <m:r>
-                              <a:rPr lang="en-US" i="1">
-                                <a:latin typeface="Cambria Math" panose="02040503050406030204" pitchFamily="18" charset="0"/>
-                              </a:rPr>
-                              <m:t>−2</m:t>
-                            </m:r>
-                          </m:e>
-                        </m:d>
+                        <m:r>
+                          <a:rPr lang="en-US" b="0" i="1" smtClean="0">
+                            <a:latin typeface="Cambria Math" panose="02040503050406030204" pitchFamily="18" charset="0"/>
+                          </a:rPr>
+                          <m:t>𝑖</m:t>
+                        </m:r>
+                        <m:r>
+                          <a:rPr lang="en-US" b="0" i="1" smtClean="0">
+                            <a:latin typeface="Cambria Math" panose="02040503050406030204" pitchFamily="18" charset="0"/>
+                          </a:rPr>
+                          <m:t>−2</m:t>
+                        </m:r>
                       </m:sub>
                     </m:sSub>
                     <m:r>
                       <a:rPr lang="en-US" i="1">
                         <a:latin typeface="Cambria Math" panose="02040503050406030204" pitchFamily="18" charset="0"/>
                       </a:rPr>
-                      <m:t>  </m:t>
+                      <m:t> </m:t>
+                    </m:r>
+                    <m:r>
+                      <a:rPr lang="en-US" b="0" i="1" smtClean="0">
+                        <a:latin typeface="Cambria Math" panose="02040503050406030204" pitchFamily="18" charset="0"/>
+                      </a:rPr>
+                      <m:t> </m:t>
+                    </m:r>
+                    <m:r>
+                      <a:rPr lang="en-US" i="1">
+                        <a:latin typeface="Cambria Math" panose="02040503050406030204" pitchFamily="18" charset="0"/>
+                      </a:rPr>
+                      <m:t> </m:t>
                     </m:r>
                     <m:sSub>
                       <m:sSubPr>
@@ -4476,38 +4313,37 @@
                         </m:r>
                       </m:e>
                       <m:sub>
-                        <m:d>
-                          <m:dPr>
-                            <m:begChr m:val="{"/>
-                            <m:endChr m:val="}"/>
-                            <m:ctrlPr>
-                              <a:rPr lang="en-US" i="1">
-                                <a:latin typeface="Cambria Math" panose="02040503050406030204" pitchFamily="18" charset="0"/>
-                              </a:rPr>
-                            </m:ctrlPr>
-                          </m:dPr>
-                          <m:e>
-                            <m:r>
-                              <a:rPr lang="en-US" i="1">
-                                <a:latin typeface="Cambria Math" panose="02040503050406030204" pitchFamily="18" charset="0"/>
-                              </a:rPr>
-                              <m:t>𝑖</m:t>
-                            </m:r>
-                            <m:r>
-                              <a:rPr lang="en-US" i="1">
-                                <a:latin typeface="Cambria Math" panose="02040503050406030204" pitchFamily="18" charset="0"/>
-                              </a:rPr>
-                              <m:t>−1</m:t>
-                            </m:r>
-                          </m:e>
-                        </m:d>
+                        <m:r>
+                          <a:rPr lang="en-US" b="0" i="1" smtClean="0">
+                            <a:latin typeface="Cambria Math" panose="02040503050406030204" pitchFamily="18" charset="0"/>
+                          </a:rPr>
+                          <m:t>𝑖</m:t>
+                        </m:r>
+                        <m:r>
+                          <a:rPr lang="en-US" b="0" i="1" smtClean="0">
+                            <a:latin typeface="Cambria Math" panose="02040503050406030204" pitchFamily="18" charset="0"/>
+                          </a:rPr>
+                          <m:t>−1</m:t>
+                        </m:r>
                       </m:sub>
                     </m:sSub>
                     <m:r>
                       <a:rPr lang="en-US" i="1">
                         <a:latin typeface="Cambria Math" panose="02040503050406030204" pitchFamily="18" charset="0"/>
                       </a:rPr>
-                      <m:t>  </m:t>
+                      <m:t> </m:t>
+                    </m:r>
+                    <m:r>
+                      <a:rPr lang="en-US" b="0" i="1" smtClean="0">
+                        <a:latin typeface="Cambria Math" panose="02040503050406030204" pitchFamily="18" charset="0"/>
+                      </a:rPr>
+                      <m:t>    </m:t>
+                    </m:r>
+                    <m:r>
+                      <a:rPr lang="en-US" i="1">
+                        <a:latin typeface="Cambria Math" panose="02040503050406030204" pitchFamily="18" charset="0"/>
+                      </a:rPr>
+                      <m:t> </m:t>
                     </m:r>
                     <m:sSub>
                       <m:sSubPr>
@@ -4526,25 +4362,12 @@
                         </m:r>
                       </m:e>
                       <m:sub>
-                        <m:d>
-                          <m:dPr>
-                            <m:begChr m:val="{"/>
-                            <m:endChr m:val="}"/>
-                            <m:ctrlPr>
-                              <a:rPr lang="en-US" i="1">
-                                <a:latin typeface="Cambria Math" panose="02040503050406030204" pitchFamily="18" charset="0"/>
-                              </a:rPr>
-                            </m:ctrlPr>
-                          </m:dPr>
-                          <m:e>
-                            <m:r>
-                              <a:rPr lang="en-US" i="1">
-                                <a:latin typeface="Cambria Math" panose="02040503050406030204" pitchFamily="18" charset="0"/>
-                              </a:rPr>
-                              <m:t>𝑖</m:t>
-                            </m:r>
-                          </m:e>
-                        </m:d>
+                        <m:r>
+                          <a:rPr lang="en-US" b="0" i="1" smtClean="0">
+                            <a:latin typeface="Cambria Math" panose="02040503050406030204" pitchFamily="18" charset="0"/>
+                          </a:rPr>
+                          <m:t>𝑖</m:t>
+                        </m:r>
                       </m:sub>
                     </m:sSub>
                   </m:oMath>
@@ -4574,8 +4397,8 @@
             </p:nvSpPr>
             <p:spPr>
               <a:xfrm>
-                <a:off x="986228" y="1844562"/>
-                <a:ext cx="2062397" cy="389337"/>
+                <a:off x="1120576" y="1837734"/>
+                <a:ext cx="2062397" cy="369332"/>
               </a:xfrm>
               <a:prstGeom prst="rect">
                 <a:avLst/>
@@ -4583,7 +4406,7 @@
               <a:blipFill>
                 <a:blip r:embed="rId5"/>
                 <a:stretch>
-                  <a:fillRect b="-12903"/>
+                  <a:fillRect b="-16667"/>
                 </a:stretch>
               </a:blipFill>
             </p:spPr>
@@ -4663,7 +4486,7 @@
         </p:nvSpPr>
         <p:spPr>
           <a:xfrm>
-            <a:off x="2031790" y="1476105"/>
+            <a:off x="2031790" y="1452042"/>
             <a:ext cx="286687" cy="436497"/>
           </a:xfrm>
           <a:prstGeom prst="triangle">
@@ -4710,7 +4533,7 @@
         </p:nvSpPr>
         <p:spPr>
           <a:xfrm>
-            <a:off x="1450296" y="1476105"/>
+            <a:off x="1450296" y="1452042"/>
             <a:ext cx="286687" cy="436497"/>
           </a:xfrm>
           <a:prstGeom prst="triangle">
@@ -5410,6 +5233,135 @@
             <a:ext cx="796805" cy="14990"/>
           </a:xfrm>
           <a:prstGeom prst="bentConnector3">
+            <a:avLst/>
+          </a:prstGeom>
+          <a:ln>
+            <a:tailEnd type="triangle"/>
+          </a:ln>
+        </p:spPr>
+        <p:style>
+          <a:lnRef idx="1">
+            <a:schemeClr val="dk1"/>
+          </a:lnRef>
+          <a:fillRef idx="0">
+            <a:schemeClr val="dk1"/>
+          </a:fillRef>
+          <a:effectRef idx="0">
+            <a:schemeClr val="dk1"/>
+          </a:effectRef>
+          <a:fontRef idx="minor">
+            <a:schemeClr val="tx1"/>
+          </a:fontRef>
+        </p:style>
+      </p:cxnSp>
+      <p:cxnSp>
+        <p:nvCxnSpPr>
+          <p:cNvPr id="5" name="Elbow Connector 4">
+            <a:extLst>
+              <a:ext uri="{FF2B5EF4-FFF2-40B4-BE49-F238E27FC236}">
+                <a16:creationId xmlns:a16="http://schemas.microsoft.com/office/drawing/2014/main" id="{6B6D7E48-782C-F549-9B47-744A53394296}"/>
+              </a:ext>
+            </a:extLst>
+          </p:cNvPr>
+          <p:cNvCxnSpPr>
+            <a:cxnSpLocks/>
+            <a:stCxn id="26" idx="0"/>
+            <a:endCxn id="8" idx="1"/>
+          </p:cNvCxnSpPr>
+          <p:nvPr/>
+        </p:nvCxnSpPr>
+        <p:spPr>
+          <a:xfrm rot="5400000" flipH="1" flipV="1">
+            <a:off x="2673540" y="4035079"/>
+            <a:ext cx="385399" cy="127109"/>
+          </a:xfrm>
+          <a:prstGeom prst="bentConnector2">
+            <a:avLst/>
+          </a:prstGeom>
+          <a:ln>
+            <a:tailEnd type="triangle"/>
+          </a:ln>
+        </p:spPr>
+        <p:style>
+          <a:lnRef idx="1">
+            <a:schemeClr val="dk1"/>
+          </a:lnRef>
+          <a:fillRef idx="0">
+            <a:schemeClr val="dk1"/>
+          </a:fillRef>
+          <a:effectRef idx="0">
+            <a:schemeClr val="dk1"/>
+          </a:effectRef>
+          <a:fontRef idx="minor">
+            <a:schemeClr val="tx1"/>
+          </a:fontRef>
+        </p:style>
+      </p:cxnSp>
+      <p:cxnSp>
+        <p:nvCxnSpPr>
+          <p:cNvPr id="13" name="Elbow Connector 12">
+            <a:extLst>
+              <a:ext uri="{FF2B5EF4-FFF2-40B4-BE49-F238E27FC236}">
+                <a16:creationId xmlns:a16="http://schemas.microsoft.com/office/drawing/2014/main" id="{68EC1A92-71D0-0A49-8889-A17B330F1844}"/>
+              </a:ext>
+            </a:extLst>
+          </p:cNvPr>
+          <p:cNvCxnSpPr>
+            <a:cxnSpLocks/>
+            <a:stCxn id="27" idx="0"/>
+            <a:endCxn id="9" idx="1"/>
+          </p:cNvCxnSpPr>
+          <p:nvPr/>
+        </p:nvCxnSpPr>
+        <p:spPr>
+          <a:xfrm rot="5400000" flipH="1" flipV="1">
+            <a:off x="2049200" y="4033105"/>
+            <a:ext cx="410084" cy="188116"/>
+          </a:xfrm>
+          <a:prstGeom prst="bentConnector2">
+            <a:avLst/>
+          </a:prstGeom>
+          <a:ln>
+            <a:tailEnd type="triangle"/>
+          </a:ln>
+        </p:spPr>
+        <p:style>
+          <a:lnRef idx="1">
+            <a:schemeClr val="dk1"/>
+          </a:lnRef>
+          <a:fillRef idx="0">
+            <a:schemeClr val="dk1"/>
+          </a:fillRef>
+          <a:effectRef idx="0">
+            <a:schemeClr val="dk1"/>
+          </a:effectRef>
+          <a:fontRef idx="minor">
+            <a:schemeClr val="tx1"/>
+          </a:fontRef>
+        </p:style>
+      </p:cxnSp>
+      <p:cxnSp>
+        <p:nvCxnSpPr>
+          <p:cNvPr id="16" name="Elbow Connector 15">
+            <a:extLst>
+              <a:ext uri="{FF2B5EF4-FFF2-40B4-BE49-F238E27FC236}">
+                <a16:creationId xmlns:a16="http://schemas.microsoft.com/office/drawing/2014/main" id="{38F026CB-6003-ED44-91B9-88FF1CA495FD}"/>
+              </a:ext>
+            </a:extLst>
+          </p:cNvPr>
+          <p:cNvCxnSpPr>
+            <a:cxnSpLocks/>
+            <a:stCxn id="28" idx="0"/>
+            <a:endCxn id="10" idx="1"/>
+          </p:cNvCxnSpPr>
+          <p:nvPr/>
+        </p:nvCxnSpPr>
+        <p:spPr>
+          <a:xfrm rot="5400000" flipH="1" flipV="1">
+            <a:off x="1451664" y="4001021"/>
+            <a:ext cx="394042" cy="236242"/>
+          </a:xfrm>
+          <a:prstGeom prst="bentConnector2">
             <a:avLst/>
           </a:prstGeom>
           <a:ln>

</xml_diff>